<commit_message>
Modify blog domain docs
</commit_message>
<xml_diff>
--- a/docs/blog/blog.pptx
+++ b/docs/blog/blog.pptx
@@ -261,7 +261,7 @@
           <a:p>
             <a:fld id="{5BBC3F03-CC7E-684B-BD54-A2A80D9D8A91}" type="datetimeFigureOut">
               <a:rPr kumimoji="1" lang="zh-CN" altLang="en-US" smtClean="0"/>
-              <a:t>2019/5/25</a:t>
+              <a:t>2019/5/26</a:t>
             </a:fld>
             <a:endParaRPr kumimoji="1" lang="zh-CN" altLang="en-US"/>
           </a:p>
@@ -459,7 +459,7 @@
           <a:p>
             <a:fld id="{5BBC3F03-CC7E-684B-BD54-A2A80D9D8A91}" type="datetimeFigureOut">
               <a:rPr kumimoji="1" lang="zh-CN" altLang="en-US" smtClean="0"/>
-              <a:t>2019/5/25</a:t>
+              <a:t>2019/5/26</a:t>
             </a:fld>
             <a:endParaRPr kumimoji="1" lang="zh-CN" altLang="en-US"/>
           </a:p>
@@ -667,7 +667,7 @@
           <a:p>
             <a:fld id="{5BBC3F03-CC7E-684B-BD54-A2A80D9D8A91}" type="datetimeFigureOut">
               <a:rPr kumimoji="1" lang="zh-CN" altLang="en-US" smtClean="0"/>
-              <a:t>2019/5/25</a:t>
+              <a:t>2019/5/26</a:t>
             </a:fld>
             <a:endParaRPr kumimoji="1" lang="zh-CN" altLang="en-US"/>
           </a:p>
@@ -865,7 +865,7 @@
           <a:p>
             <a:fld id="{5BBC3F03-CC7E-684B-BD54-A2A80D9D8A91}" type="datetimeFigureOut">
               <a:rPr kumimoji="1" lang="zh-CN" altLang="en-US" smtClean="0"/>
-              <a:t>2019/5/25</a:t>
+              <a:t>2019/5/26</a:t>
             </a:fld>
             <a:endParaRPr kumimoji="1" lang="zh-CN" altLang="en-US"/>
           </a:p>
@@ -1140,7 +1140,7 @@
           <a:p>
             <a:fld id="{5BBC3F03-CC7E-684B-BD54-A2A80D9D8A91}" type="datetimeFigureOut">
               <a:rPr kumimoji="1" lang="zh-CN" altLang="en-US" smtClean="0"/>
-              <a:t>2019/5/25</a:t>
+              <a:t>2019/5/26</a:t>
             </a:fld>
             <a:endParaRPr kumimoji="1" lang="zh-CN" altLang="en-US"/>
           </a:p>
@@ -1405,7 +1405,7 @@
           <a:p>
             <a:fld id="{5BBC3F03-CC7E-684B-BD54-A2A80D9D8A91}" type="datetimeFigureOut">
               <a:rPr kumimoji="1" lang="zh-CN" altLang="en-US" smtClean="0"/>
-              <a:t>2019/5/25</a:t>
+              <a:t>2019/5/26</a:t>
             </a:fld>
             <a:endParaRPr kumimoji="1" lang="zh-CN" altLang="en-US"/>
           </a:p>
@@ -1817,7 +1817,7 @@
           <a:p>
             <a:fld id="{5BBC3F03-CC7E-684B-BD54-A2A80D9D8A91}" type="datetimeFigureOut">
               <a:rPr kumimoji="1" lang="zh-CN" altLang="en-US" smtClean="0"/>
-              <a:t>2019/5/25</a:t>
+              <a:t>2019/5/26</a:t>
             </a:fld>
             <a:endParaRPr kumimoji="1" lang="zh-CN" altLang="en-US"/>
           </a:p>
@@ -1958,7 +1958,7 @@
           <a:p>
             <a:fld id="{5BBC3F03-CC7E-684B-BD54-A2A80D9D8A91}" type="datetimeFigureOut">
               <a:rPr kumimoji="1" lang="zh-CN" altLang="en-US" smtClean="0"/>
-              <a:t>2019/5/25</a:t>
+              <a:t>2019/5/26</a:t>
             </a:fld>
             <a:endParaRPr kumimoji="1" lang="zh-CN" altLang="en-US"/>
           </a:p>
@@ -2071,7 +2071,7 @@
           <a:p>
             <a:fld id="{5BBC3F03-CC7E-684B-BD54-A2A80D9D8A91}" type="datetimeFigureOut">
               <a:rPr kumimoji="1" lang="zh-CN" altLang="en-US" smtClean="0"/>
-              <a:t>2019/5/25</a:t>
+              <a:t>2019/5/26</a:t>
             </a:fld>
             <a:endParaRPr kumimoji="1" lang="zh-CN" altLang="en-US"/>
           </a:p>
@@ -2382,7 +2382,7 @@
           <a:p>
             <a:fld id="{5BBC3F03-CC7E-684B-BD54-A2A80D9D8A91}" type="datetimeFigureOut">
               <a:rPr kumimoji="1" lang="zh-CN" altLang="en-US" smtClean="0"/>
-              <a:t>2019/5/25</a:t>
+              <a:t>2019/5/26</a:t>
             </a:fld>
             <a:endParaRPr kumimoji="1" lang="zh-CN" altLang="en-US"/>
           </a:p>
@@ -2670,7 +2670,7 @@
           <a:p>
             <a:fld id="{5BBC3F03-CC7E-684B-BD54-A2A80D9D8A91}" type="datetimeFigureOut">
               <a:rPr kumimoji="1" lang="zh-CN" altLang="en-US" smtClean="0"/>
-              <a:t>2019/5/25</a:t>
+              <a:t>2019/5/26</a:t>
             </a:fld>
             <a:endParaRPr kumimoji="1" lang="zh-CN" altLang="en-US"/>
           </a:p>
@@ -2911,7 +2911,7 @@
           <a:p>
             <a:fld id="{5BBC3F03-CC7E-684B-BD54-A2A80D9D8A91}" type="datetimeFigureOut">
               <a:rPr kumimoji="1" lang="zh-CN" altLang="en-US" smtClean="0"/>
-              <a:t>2019/5/25</a:t>
+              <a:t>2019/5/26</a:t>
             </a:fld>
             <a:endParaRPr kumimoji="1" lang="zh-CN" altLang="en-US"/>
           </a:p>
@@ -5878,10 +5878,10 @@
       </p:sp>
       <p:pic>
         <p:nvPicPr>
-          <p:cNvPr id="3" name="图片 2" descr="图片包含 文字, 地图&#10;&#10;描述已自动生成">
-            <a:extLst>
-              <a:ext uri="{FF2B5EF4-FFF2-40B4-BE49-F238E27FC236}">
-                <a16:creationId xmlns:a16="http://schemas.microsoft.com/office/drawing/2014/main" id="{68D8DA06-B248-674A-8B10-3D1D967BB6A5}"/>
+          <p:cNvPr id="5" name="图片 4" descr="图片包含 文字, 地图&#10;&#10;描述已自动生成">
+            <a:extLst>
+              <a:ext uri="{FF2B5EF4-FFF2-40B4-BE49-F238E27FC236}">
+                <a16:creationId xmlns:a16="http://schemas.microsoft.com/office/drawing/2014/main" id="{B2FD2ABD-AACE-2F49-8392-21D81FB41BD5}"/>
               </a:ext>
             </a:extLst>
           </p:cNvPr>
@@ -5898,8 +5898,8 @@
         </p:blipFill>
         <p:spPr>
           <a:xfrm>
-            <a:off x="1556971" y="0"/>
-            <a:ext cx="9078058" cy="6858000"/>
+            <a:off x="1842074" y="0"/>
+            <a:ext cx="8507851" cy="6858000"/>
           </a:xfrm>
           <a:prstGeom prst="rect">
             <a:avLst/>

</xml_diff>